<commit_message>
fix text size and shape color
</commit_message>
<xml_diff>
--- a/test.pptx
+++ b/test.pptx
@@ -3138,7 +3138,12 @@
           <a:prstGeom prst="rect">
             <a:avLst/>
           </a:prstGeom>
-          <a:solidFill/>
+          <a:noFill/>
+          <a:ln>
+            <a:solidFill>
+              <a:srgbClr val="000000"/>
+            </a:solidFill>
+          </a:ln>
         </p:spPr>
         <p:style>
           <a:lnRef idx="1">

</xml_diff>